<commit_message>
transcripts for videos. lecture2 in progress. video files stay out of git.
</commit_message>
<xml_diff>
--- a/slides/day1_slides.pptx
+++ b/slides/day1_slides.pptx
@@ -5,7 +5,7 @@
     <p:sldMasterId id="2147483648" r:id="rId1"/>
   </p:sldMasterIdLst>
   <p:notesMasterIdLst>
-    <p:notesMasterId r:id="rId79"/>
+    <p:notesMasterId r:id="rId80"/>
   </p:notesMasterIdLst>
   <p:sldIdLst>
     <p:sldId id="256" r:id="rId2"/>
@@ -85,6 +85,7 @@
     <p:sldId id="359" r:id="rId76"/>
     <p:sldId id="360" r:id="rId77"/>
     <p:sldId id="361" r:id="rId78"/>
+    <p:sldId id="378" r:id="rId79"/>
   </p:sldIdLst>
   <p:sldSz cx="9144000" cy="5143500" type="screen16x9"/>
   <p:notesSz cx="6858000" cy="9144000"/>
@@ -284,7 +285,7 @@
           <a:p>
             <a:fld id="{AD83FA78-DD4F-EC49-A182-670E744C8689}" type="datetimeFigureOut">
               <a:rPr lang="en-US" smtClean="0"/>
-              <a:t>6/16/23</a:t>
+              <a:t>7/18/23</a:t>
             </a:fld>
             <a:endParaRPr lang="en-US"/>
           </a:p>
@@ -2749,7 +2750,7 @@
           <a:p>
             <a:fld id="{241EB5C9-1307-BA42-ABA2-0BC069CD8E7F}" type="datetimeFigureOut">
               <a:rPr lang="en-US" smtClean="0"/>
-              <a:t>6/16/23</a:t>
+              <a:t>7/18/23</a:t>
             </a:fld>
             <a:endParaRPr lang="en-US"/>
           </a:p>
@@ -2917,7 +2918,7 @@
           <a:p>
             <a:fld id="{241EB5C9-1307-BA42-ABA2-0BC069CD8E7F}" type="datetimeFigureOut">
               <a:rPr lang="en-US" smtClean="0"/>
-              <a:t>6/16/23</a:t>
+              <a:t>7/18/23</a:t>
             </a:fld>
             <a:endParaRPr lang="en-US"/>
           </a:p>
@@ -3095,7 +3096,7 @@
           <a:p>
             <a:fld id="{241EB5C9-1307-BA42-ABA2-0BC069CD8E7F}" type="datetimeFigureOut">
               <a:rPr lang="en-US" smtClean="0"/>
-              <a:t>6/16/23</a:t>
+              <a:t>7/18/23</a:t>
             </a:fld>
             <a:endParaRPr lang="en-US"/>
           </a:p>
@@ -3263,7 +3264,7 @@
           <a:p>
             <a:fld id="{241EB5C9-1307-BA42-ABA2-0BC069CD8E7F}" type="datetimeFigureOut">
               <a:rPr lang="en-US" smtClean="0"/>
-              <a:t>6/16/23</a:t>
+              <a:t>7/18/23</a:t>
             </a:fld>
             <a:endParaRPr lang="en-US"/>
           </a:p>
@@ -3508,7 +3509,7 @@
           <a:p>
             <a:fld id="{241EB5C9-1307-BA42-ABA2-0BC069CD8E7F}" type="datetimeFigureOut">
               <a:rPr lang="en-US" smtClean="0"/>
-              <a:t>6/16/23</a:t>
+              <a:t>7/18/23</a:t>
             </a:fld>
             <a:endParaRPr lang="en-US"/>
           </a:p>
@@ -3793,7 +3794,7 @@
           <a:p>
             <a:fld id="{241EB5C9-1307-BA42-ABA2-0BC069CD8E7F}" type="datetimeFigureOut">
               <a:rPr lang="en-US" smtClean="0"/>
-              <a:t>6/16/23</a:t>
+              <a:t>7/18/23</a:t>
             </a:fld>
             <a:endParaRPr lang="en-US"/>
           </a:p>
@@ -4212,7 +4213,7 @@
           <a:p>
             <a:fld id="{241EB5C9-1307-BA42-ABA2-0BC069CD8E7F}" type="datetimeFigureOut">
               <a:rPr lang="en-US" smtClean="0"/>
-              <a:t>6/16/23</a:t>
+              <a:t>7/18/23</a:t>
             </a:fld>
             <a:endParaRPr lang="en-US"/>
           </a:p>
@@ -4329,7 +4330,7 @@
           <a:p>
             <a:fld id="{241EB5C9-1307-BA42-ABA2-0BC069CD8E7F}" type="datetimeFigureOut">
               <a:rPr lang="en-US" smtClean="0"/>
-              <a:t>6/16/23</a:t>
+              <a:t>7/18/23</a:t>
             </a:fld>
             <a:endParaRPr lang="en-US"/>
           </a:p>
@@ -4424,7 +4425,7 @@
           <a:p>
             <a:fld id="{241EB5C9-1307-BA42-ABA2-0BC069CD8E7F}" type="datetimeFigureOut">
               <a:rPr lang="en-US" smtClean="0"/>
-              <a:t>6/16/23</a:t>
+              <a:t>7/18/23</a:t>
             </a:fld>
             <a:endParaRPr lang="en-US"/>
           </a:p>
@@ -4699,7 +4700,7 @@
           <a:p>
             <a:fld id="{241EB5C9-1307-BA42-ABA2-0BC069CD8E7F}" type="datetimeFigureOut">
               <a:rPr lang="en-US" smtClean="0"/>
-              <a:t>6/16/23</a:t>
+              <a:t>7/18/23</a:t>
             </a:fld>
             <a:endParaRPr lang="en-US"/>
           </a:p>
@@ -4951,7 +4952,7 @@
           <a:p>
             <a:fld id="{241EB5C9-1307-BA42-ABA2-0BC069CD8E7F}" type="datetimeFigureOut">
               <a:rPr lang="en-US" smtClean="0"/>
-              <a:t>6/16/23</a:t>
+              <a:t>7/18/23</a:t>
             </a:fld>
             <a:endParaRPr lang="en-US"/>
           </a:p>
@@ -5162,7 +5163,7 @@
           <a:p>
             <a:fld id="{241EB5C9-1307-BA42-ABA2-0BC069CD8E7F}" type="datetimeFigureOut">
               <a:rPr lang="en-US" smtClean="0"/>
-              <a:t>6/16/23</a:t>
+              <a:t>7/18/23</a:t>
             </a:fld>
             <a:endParaRPr lang="en-US"/>
           </a:p>
@@ -47480,6 +47481,509 @@
     <p:extLst>
       <p:ext uri="{BB962C8B-B14F-4D97-AF65-F5344CB8AC3E}">
         <p14:creationId xmlns:p14="http://schemas.microsoft.com/office/powerpoint/2010/main" val="3116212724"/>
+      </p:ext>
+    </p:extLst>
+  </p:cSld>
+  <p:clrMapOvr>
+    <a:masterClrMapping/>
+  </p:clrMapOvr>
+</p:sld>
+</file>
+
+<file path=ppt/slides/slide78.xml><?xml version="1.0" encoding="utf-8"?>
+<p:sld xmlns:a="http://schemas.openxmlformats.org/drawingml/2006/main" xmlns:r="http://schemas.openxmlformats.org/officeDocument/2006/relationships" xmlns:p="http://schemas.openxmlformats.org/presentationml/2006/main">
+  <p:cSld>
+    <p:spTree>
+      <p:nvGrpSpPr>
+        <p:cNvPr id="1" name=""/>
+        <p:cNvGrpSpPr/>
+        <p:nvPr/>
+      </p:nvGrpSpPr>
+      <p:grpSpPr>
+        <a:xfrm>
+          <a:off x="0" y="0"/>
+          <a:ext cx="0" cy="0"/>
+          <a:chOff x="0" y="0"/>
+          <a:chExt cx="0" cy="0"/>
+        </a:xfrm>
+      </p:grpSpPr>
+      <p:sp>
+        <p:nvSpPr>
+          <p:cNvPr id="2" name="Title 1">
+            <a:extLst>
+              <a:ext uri="{FF2B5EF4-FFF2-40B4-BE49-F238E27FC236}">
+                <a16:creationId xmlns:a16="http://schemas.microsoft.com/office/drawing/2014/main" id="{4C86968C-27A2-2442-FA32-8D9E4EAFC1EE}"/>
+              </a:ext>
+            </a:extLst>
+          </p:cNvPr>
+          <p:cNvSpPr>
+            <a:spLocks noGrp="1"/>
+          </p:cNvSpPr>
+          <p:nvPr>
+            <p:ph type="title"/>
+          </p:nvPr>
+        </p:nvSpPr>
+        <p:spPr>
+          <a:xfrm>
+            <a:off x="457200" y="287488"/>
+            <a:ext cx="8229600" cy="857250"/>
+          </a:xfrm>
+        </p:spPr>
+        <p:txBody>
+          <a:bodyPr>
+            <a:normAutofit/>
+          </a:bodyPr>
+          <a:lstStyle/>
+          <a:p>
+            <a:r>
+              <a:rPr lang="en-US" sz="1800" dirty="0"/>
+              <a:t>Course websites</a:t>
+            </a:r>
+          </a:p>
+        </p:txBody>
+      </p:sp>
+      <p:sp>
+        <p:nvSpPr>
+          <p:cNvPr id="3" name="Content Placeholder 2">
+            <a:extLst>
+              <a:ext uri="{FF2B5EF4-FFF2-40B4-BE49-F238E27FC236}">
+                <a16:creationId xmlns:a16="http://schemas.microsoft.com/office/drawing/2014/main" id="{F5B2F8F2-A4B2-AD3C-1E04-94E0E3EF2677}"/>
+              </a:ext>
+            </a:extLst>
+          </p:cNvPr>
+          <p:cNvSpPr>
+            <a:spLocks noGrp="1"/>
+          </p:cNvSpPr>
+          <p:nvPr>
+            <p:ph idx="1"/>
+          </p:nvPr>
+        </p:nvSpPr>
+        <p:spPr>
+          <a:xfrm>
+            <a:off x="457200" y="900880"/>
+            <a:ext cx="8229600" cy="857250"/>
+          </a:xfrm>
+        </p:spPr>
+        <p:txBody>
+          <a:bodyPr>
+            <a:normAutofit/>
+          </a:bodyPr>
+          <a:lstStyle/>
+          <a:p>
+            <a:pPr marL="0" indent="0">
+              <a:buNone/>
+            </a:pPr>
+            <a:r>
+              <a:rPr lang="en-US" sz="1800" dirty="0"/>
+              <a:t>Days 1-2: </a:t>
+            </a:r>
+            <a:r>
+              <a:rPr lang="en-US" sz="1800" dirty="0">
+                <a:hlinkClick r:id="rId2"/>
+              </a:rPr>
+              <a:t>https://role-model.github.io/multidim-biodiv-data/</a:t>
+            </a:r>
+            <a:r>
+              <a:rPr lang="en-US" sz="1800" dirty="0"/>
+              <a:t> </a:t>
+            </a:r>
+          </a:p>
+          <a:p>
+            <a:pPr marL="0" indent="0">
+              <a:buNone/>
+            </a:pPr>
+            <a:r>
+              <a:rPr lang="en-US" sz="1800" dirty="0"/>
+              <a:t>Days 3-4 (this workshop): </a:t>
+            </a:r>
+            <a:r>
+              <a:rPr lang="en-US" sz="1800" dirty="0">
+                <a:hlinkClick r:id="rId3"/>
+              </a:rPr>
+              <a:t>https://role-model.github.io/process-models-workshop</a:t>
+            </a:r>
+            <a:endParaRPr lang="en-US" sz="1800" dirty="0"/>
+          </a:p>
+          <a:p>
+            <a:pPr marL="0" indent="0">
+              <a:buNone/>
+            </a:pPr>
+            <a:endParaRPr lang="en-US" sz="1800" dirty="0"/>
+          </a:p>
+        </p:txBody>
+      </p:sp>
+      <p:sp>
+        <p:nvSpPr>
+          <p:cNvPr id="5" name="Content Placeholder 2">
+            <a:extLst>
+              <a:ext uri="{FF2B5EF4-FFF2-40B4-BE49-F238E27FC236}">
+                <a16:creationId xmlns:a16="http://schemas.microsoft.com/office/drawing/2014/main" id="{E5394655-EAF9-9CEB-B1B3-0575470F3290}"/>
+              </a:ext>
+            </a:extLst>
+          </p:cNvPr>
+          <p:cNvSpPr txBox="1">
+            <a:spLocks/>
+          </p:cNvSpPr>
+          <p:nvPr/>
+        </p:nvSpPr>
+        <p:spPr>
+          <a:xfrm>
+            <a:off x="457200" y="2371522"/>
+            <a:ext cx="8229600" cy="857250"/>
+          </a:xfrm>
+          <a:prstGeom prst="rect">
+            <a:avLst/>
+          </a:prstGeom>
+        </p:spPr>
+        <p:txBody>
+          <a:bodyPr vert="horz" lIns="91440" tIns="45720" rIns="91440" bIns="45720" rtlCol="0">
+            <a:normAutofit/>
+          </a:bodyPr>
+          <a:lstStyle>
+            <a:lvl1pPr marL="342900" indent="-342900" algn="l" defTabSz="342900" rtl="0" eaLnBrk="1" latinLnBrk="0" hangingPunct="1">
+              <a:spcBef>
+                <a:spcPct val="20000"/>
+              </a:spcBef>
+              <a:buFont typeface="Arial"/>
+              <a:buChar char="•"/>
+              <a:defRPr sz="2400" kern="1200">
+                <a:solidFill>
+                  <a:schemeClr val="tx1"/>
+                </a:solidFill>
+                <a:latin typeface="+mn-lt"/>
+                <a:ea typeface="+mn-ea"/>
+                <a:cs typeface="+mn-cs"/>
+              </a:defRPr>
+            </a:lvl1pPr>
+            <a:lvl2pPr marL="685800" indent="-342900" algn="l" defTabSz="342900" rtl="0" eaLnBrk="1" latinLnBrk="0" hangingPunct="1">
+              <a:spcBef>
+                <a:spcPct val="20000"/>
+              </a:spcBef>
+              <a:buFont typeface="Arial"/>
+              <a:buChar char="–"/>
+              <a:defRPr sz="2100" kern="1200">
+                <a:solidFill>
+                  <a:schemeClr val="tx1"/>
+                </a:solidFill>
+                <a:latin typeface="+mn-lt"/>
+                <a:ea typeface="+mn-ea"/>
+                <a:cs typeface="+mn-cs"/>
+              </a:defRPr>
+            </a:lvl2pPr>
+            <a:lvl3pPr marL="1028700" indent="-342900" algn="l" defTabSz="342900" rtl="0" eaLnBrk="1" latinLnBrk="0" hangingPunct="1">
+              <a:spcBef>
+                <a:spcPct val="20000"/>
+              </a:spcBef>
+              <a:buFont typeface="Arial"/>
+              <a:buChar char="•"/>
+              <a:defRPr sz="1800" kern="1200">
+                <a:solidFill>
+                  <a:schemeClr val="tx1"/>
+                </a:solidFill>
+                <a:latin typeface="+mn-lt"/>
+                <a:ea typeface="+mn-ea"/>
+                <a:cs typeface="+mn-cs"/>
+              </a:defRPr>
+            </a:lvl3pPr>
+            <a:lvl4pPr marL="1371600" indent="-342900" algn="l" defTabSz="342900" rtl="0" eaLnBrk="1" latinLnBrk="0" hangingPunct="1">
+              <a:spcBef>
+                <a:spcPct val="20000"/>
+              </a:spcBef>
+              <a:buFont typeface="Arial"/>
+              <a:buChar char="–"/>
+              <a:defRPr sz="1500" kern="1200">
+                <a:solidFill>
+                  <a:schemeClr val="tx1"/>
+                </a:solidFill>
+                <a:latin typeface="+mn-lt"/>
+                <a:ea typeface="+mn-ea"/>
+                <a:cs typeface="+mn-cs"/>
+              </a:defRPr>
+            </a:lvl4pPr>
+            <a:lvl5pPr marL="1714500" indent="-342900" algn="l" defTabSz="342900" rtl="0" eaLnBrk="1" latinLnBrk="0" hangingPunct="1">
+              <a:spcBef>
+                <a:spcPct val="20000"/>
+              </a:spcBef>
+              <a:buFont typeface="Arial"/>
+              <a:buChar char="»"/>
+              <a:defRPr sz="1500" kern="1200">
+                <a:solidFill>
+                  <a:schemeClr val="tx1"/>
+                </a:solidFill>
+                <a:latin typeface="+mn-lt"/>
+                <a:ea typeface="+mn-ea"/>
+                <a:cs typeface="+mn-cs"/>
+              </a:defRPr>
+            </a:lvl5pPr>
+            <a:lvl6pPr marL="2057400" indent="-342900" algn="l" defTabSz="342900" rtl="0" eaLnBrk="1" latinLnBrk="0" hangingPunct="1">
+              <a:spcBef>
+                <a:spcPct val="20000"/>
+              </a:spcBef>
+              <a:buFont typeface="Arial"/>
+              <a:buChar char="•"/>
+              <a:defRPr sz="1500" kern="1200">
+                <a:solidFill>
+                  <a:schemeClr val="tx1"/>
+                </a:solidFill>
+                <a:latin typeface="+mn-lt"/>
+                <a:ea typeface="+mn-ea"/>
+                <a:cs typeface="+mn-cs"/>
+              </a:defRPr>
+            </a:lvl6pPr>
+            <a:lvl7pPr marL="2400300" indent="-342900" algn="l" defTabSz="342900" rtl="0" eaLnBrk="1" latinLnBrk="0" hangingPunct="1">
+              <a:spcBef>
+                <a:spcPct val="20000"/>
+              </a:spcBef>
+              <a:buFont typeface="Arial"/>
+              <a:buChar char="•"/>
+              <a:defRPr sz="1500" kern="1200">
+                <a:solidFill>
+                  <a:schemeClr val="tx1"/>
+                </a:solidFill>
+                <a:latin typeface="+mn-lt"/>
+                <a:ea typeface="+mn-ea"/>
+                <a:cs typeface="+mn-cs"/>
+              </a:defRPr>
+            </a:lvl7pPr>
+            <a:lvl8pPr marL="2743200" indent="-342900" algn="l" defTabSz="342900" rtl="0" eaLnBrk="1" latinLnBrk="0" hangingPunct="1">
+              <a:spcBef>
+                <a:spcPct val="20000"/>
+              </a:spcBef>
+              <a:buFont typeface="Arial"/>
+              <a:buChar char="•"/>
+              <a:defRPr sz="1500" kern="1200">
+                <a:solidFill>
+                  <a:schemeClr val="tx1"/>
+                </a:solidFill>
+                <a:latin typeface="+mn-lt"/>
+                <a:ea typeface="+mn-ea"/>
+                <a:cs typeface="+mn-cs"/>
+              </a:defRPr>
+            </a:lvl8pPr>
+            <a:lvl9pPr marL="3086100" indent="-342900" algn="l" defTabSz="342900" rtl="0" eaLnBrk="1" latinLnBrk="0" hangingPunct="1">
+              <a:spcBef>
+                <a:spcPct val="20000"/>
+              </a:spcBef>
+              <a:buFont typeface="Arial"/>
+              <a:buChar char="•"/>
+              <a:defRPr sz="1500" kern="1200">
+                <a:solidFill>
+                  <a:schemeClr val="tx1"/>
+                </a:solidFill>
+                <a:latin typeface="+mn-lt"/>
+                <a:ea typeface="+mn-ea"/>
+                <a:cs typeface="+mn-cs"/>
+              </a:defRPr>
+            </a:lvl9pPr>
+          </a:lstStyle>
+          <a:p>
+            <a:pPr marL="0" indent="0">
+              <a:buFont typeface="Arial"/>
+              <a:buNone/>
+            </a:pPr>
+            <a:r>
+              <a:rPr lang="en-US" sz="1800" dirty="0"/>
+              <a:t>Materials developed by Renata Diaz, Isaac Overcast, Andy Rominger, Connor French, Jacob Idec, and </a:t>
+            </a:r>
+            <a:r>
+              <a:rPr lang="en-US" sz="1800" dirty="0" err="1"/>
+              <a:t>Rilquer</a:t>
+            </a:r>
+            <a:r>
+              <a:rPr lang="en-US" sz="1800" dirty="0"/>
+              <a:t> </a:t>
+            </a:r>
+            <a:r>
+              <a:rPr lang="en-US" sz="1800" dirty="0" err="1"/>
+              <a:t>Mascarenhas</a:t>
+            </a:r>
+            <a:r>
+              <a:rPr lang="en-US" sz="1800" dirty="0"/>
+              <a:t>. Lectures recorded by Renata Diaz. </a:t>
+            </a:r>
+          </a:p>
+        </p:txBody>
+      </p:sp>
+      <p:sp>
+        <p:nvSpPr>
+          <p:cNvPr id="6" name="Content Placeholder 2">
+            <a:extLst>
+              <a:ext uri="{FF2B5EF4-FFF2-40B4-BE49-F238E27FC236}">
+                <a16:creationId xmlns:a16="http://schemas.microsoft.com/office/drawing/2014/main" id="{3A1279E2-A7A8-FB07-7690-86239EE32587}"/>
+              </a:ext>
+            </a:extLst>
+          </p:cNvPr>
+          <p:cNvSpPr txBox="1">
+            <a:spLocks/>
+          </p:cNvSpPr>
+          <p:nvPr/>
+        </p:nvSpPr>
+        <p:spPr>
+          <a:xfrm>
+            <a:off x="457200" y="3633194"/>
+            <a:ext cx="8229600" cy="857250"/>
+          </a:xfrm>
+          <a:prstGeom prst="rect">
+            <a:avLst/>
+          </a:prstGeom>
+        </p:spPr>
+        <p:txBody>
+          <a:bodyPr vert="horz" lIns="91440" tIns="45720" rIns="91440" bIns="45720" rtlCol="0">
+            <a:normAutofit/>
+          </a:bodyPr>
+          <a:lstStyle>
+            <a:lvl1pPr marL="342900" indent="-342900" algn="l" defTabSz="342900" rtl="0" eaLnBrk="1" latinLnBrk="0" hangingPunct="1">
+              <a:spcBef>
+                <a:spcPct val="20000"/>
+              </a:spcBef>
+              <a:buFont typeface="Arial"/>
+              <a:buChar char="•"/>
+              <a:defRPr sz="2400" kern="1200">
+                <a:solidFill>
+                  <a:schemeClr val="tx1"/>
+                </a:solidFill>
+                <a:latin typeface="+mn-lt"/>
+                <a:ea typeface="+mn-ea"/>
+                <a:cs typeface="+mn-cs"/>
+              </a:defRPr>
+            </a:lvl1pPr>
+            <a:lvl2pPr marL="685800" indent="-342900" algn="l" defTabSz="342900" rtl="0" eaLnBrk="1" latinLnBrk="0" hangingPunct="1">
+              <a:spcBef>
+                <a:spcPct val="20000"/>
+              </a:spcBef>
+              <a:buFont typeface="Arial"/>
+              <a:buChar char="–"/>
+              <a:defRPr sz="2100" kern="1200">
+                <a:solidFill>
+                  <a:schemeClr val="tx1"/>
+                </a:solidFill>
+                <a:latin typeface="+mn-lt"/>
+                <a:ea typeface="+mn-ea"/>
+                <a:cs typeface="+mn-cs"/>
+              </a:defRPr>
+            </a:lvl2pPr>
+            <a:lvl3pPr marL="1028700" indent="-342900" algn="l" defTabSz="342900" rtl="0" eaLnBrk="1" latinLnBrk="0" hangingPunct="1">
+              <a:spcBef>
+                <a:spcPct val="20000"/>
+              </a:spcBef>
+              <a:buFont typeface="Arial"/>
+              <a:buChar char="•"/>
+              <a:defRPr sz="1800" kern="1200">
+                <a:solidFill>
+                  <a:schemeClr val="tx1"/>
+                </a:solidFill>
+                <a:latin typeface="+mn-lt"/>
+                <a:ea typeface="+mn-ea"/>
+                <a:cs typeface="+mn-cs"/>
+              </a:defRPr>
+            </a:lvl3pPr>
+            <a:lvl4pPr marL="1371600" indent="-342900" algn="l" defTabSz="342900" rtl="0" eaLnBrk="1" latinLnBrk="0" hangingPunct="1">
+              <a:spcBef>
+                <a:spcPct val="20000"/>
+              </a:spcBef>
+              <a:buFont typeface="Arial"/>
+              <a:buChar char="–"/>
+              <a:defRPr sz="1500" kern="1200">
+                <a:solidFill>
+                  <a:schemeClr val="tx1"/>
+                </a:solidFill>
+                <a:latin typeface="+mn-lt"/>
+                <a:ea typeface="+mn-ea"/>
+                <a:cs typeface="+mn-cs"/>
+              </a:defRPr>
+            </a:lvl4pPr>
+            <a:lvl5pPr marL="1714500" indent="-342900" algn="l" defTabSz="342900" rtl="0" eaLnBrk="1" latinLnBrk="0" hangingPunct="1">
+              <a:spcBef>
+                <a:spcPct val="20000"/>
+              </a:spcBef>
+              <a:buFont typeface="Arial"/>
+              <a:buChar char="»"/>
+              <a:defRPr sz="1500" kern="1200">
+                <a:solidFill>
+                  <a:schemeClr val="tx1"/>
+                </a:solidFill>
+                <a:latin typeface="+mn-lt"/>
+                <a:ea typeface="+mn-ea"/>
+                <a:cs typeface="+mn-cs"/>
+              </a:defRPr>
+            </a:lvl5pPr>
+            <a:lvl6pPr marL="2057400" indent="-342900" algn="l" defTabSz="342900" rtl="0" eaLnBrk="1" latinLnBrk="0" hangingPunct="1">
+              <a:spcBef>
+                <a:spcPct val="20000"/>
+              </a:spcBef>
+              <a:buFont typeface="Arial"/>
+              <a:buChar char="•"/>
+              <a:defRPr sz="1500" kern="1200">
+                <a:solidFill>
+                  <a:schemeClr val="tx1"/>
+                </a:solidFill>
+                <a:latin typeface="+mn-lt"/>
+                <a:ea typeface="+mn-ea"/>
+                <a:cs typeface="+mn-cs"/>
+              </a:defRPr>
+            </a:lvl6pPr>
+            <a:lvl7pPr marL="2400300" indent="-342900" algn="l" defTabSz="342900" rtl="0" eaLnBrk="1" latinLnBrk="0" hangingPunct="1">
+              <a:spcBef>
+                <a:spcPct val="20000"/>
+              </a:spcBef>
+              <a:buFont typeface="Arial"/>
+              <a:buChar char="•"/>
+              <a:defRPr sz="1500" kern="1200">
+                <a:solidFill>
+                  <a:schemeClr val="tx1"/>
+                </a:solidFill>
+                <a:latin typeface="+mn-lt"/>
+                <a:ea typeface="+mn-ea"/>
+                <a:cs typeface="+mn-cs"/>
+              </a:defRPr>
+            </a:lvl7pPr>
+            <a:lvl8pPr marL="2743200" indent="-342900" algn="l" defTabSz="342900" rtl="0" eaLnBrk="1" latinLnBrk="0" hangingPunct="1">
+              <a:spcBef>
+                <a:spcPct val="20000"/>
+              </a:spcBef>
+              <a:buFont typeface="Arial"/>
+              <a:buChar char="•"/>
+              <a:defRPr sz="1500" kern="1200">
+                <a:solidFill>
+                  <a:schemeClr val="tx1"/>
+                </a:solidFill>
+                <a:latin typeface="+mn-lt"/>
+                <a:ea typeface="+mn-ea"/>
+                <a:cs typeface="+mn-cs"/>
+              </a:defRPr>
+            </a:lvl8pPr>
+            <a:lvl9pPr marL="3086100" indent="-342900" algn="l" defTabSz="342900" rtl="0" eaLnBrk="1" latinLnBrk="0" hangingPunct="1">
+              <a:spcBef>
+                <a:spcPct val="20000"/>
+              </a:spcBef>
+              <a:buFont typeface="Arial"/>
+              <a:buChar char="•"/>
+              <a:defRPr sz="1500" kern="1200">
+                <a:solidFill>
+                  <a:schemeClr val="tx1"/>
+                </a:solidFill>
+                <a:latin typeface="+mn-lt"/>
+                <a:ea typeface="+mn-ea"/>
+                <a:cs typeface="+mn-cs"/>
+              </a:defRPr>
+            </a:lvl9pPr>
+          </a:lstStyle>
+          <a:p>
+            <a:pPr marL="0" indent="0">
+              <a:buFont typeface="Arial"/>
+              <a:buNone/>
+            </a:pPr>
+            <a:r>
+              <a:rPr lang="en-US" sz="1800" dirty="0"/>
+              <a:t>The development of these materials was supported by NSF awards DBI-2208901 to Renata Diaz and DBI-2104147 to the other authors.</a:t>
+            </a:r>
+          </a:p>
+        </p:txBody>
+      </p:sp>
+    </p:spTree>
+    <p:extLst>
+      <p:ext uri="{BB962C8B-B14F-4D97-AF65-F5344CB8AC3E}">
+        <p14:creationId xmlns:p14="http://schemas.microsoft.com/office/powerpoint/2010/main" val="2751228423"/>
       </p:ext>
     </p:extLst>
   </p:cSld>

</xml_diff>